<commit_message>
Ajuste mapa mat 8 tema 5
</commit_message>
<xml_diff>
--- a/fuentes/contenidos/grado08/guion05/MA_08_05_CO_REC330.pptx
+++ b/fuentes/contenidos/grado08/guion05/MA_08_05_CO_REC330.pptx
@@ -1551,7 +1551,7 @@
         </p:nvCxnSpPr>
         <p:spPr>
           <a:xfrm rot="5400000">
-            <a:off x="3773589" y="851426"/>
+            <a:off x="3778452" y="853212"/>
             <a:ext cx="330040" cy="1615690"/>
           </a:xfrm>
           <a:prstGeom prst="bentConnector3">
@@ -1588,7 +1588,7 @@
         </p:nvCxnSpPr>
         <p:spPr>
           <a:xfrm>
-            <a:off x="4750177" y="911632"/>
+            <a:off x="4759650" y="918037"/>
             <a:ext cx="2824707" cy="785014"/>
           </a:xfrm>
           <a:prstGeom prst="bentConnector3">
@@ -2592,7 +2592,7 @@
         </p:nvCxnSpPr>
         <p:spPr>
           <a:xfrm>
-            <a:off x="4730890" y="1639475"/>
+            <a:off x="4747950" y="1647316"/>
             <a:ext cx="1322372" cy="149805"/>
           </a:xfrm>
           <a:prstGeom prst="bentConnector3">
@@ -3545,17 +3545,7 @@
                 <a:latin typeface="Arial" panose="020B0604020202020204" pitchFamily="34" charset="0"/>
                 <a:cs typeface="Arial" panose="020B0604020202020204" pitchFamily="34" charset="0"/>
               </a:rPr>
-              <a:t>multiplicando la expresión algebraica del dividendo por la expresión algebraica recíproca del </a:t>
-            </a:r>
-            <a:r>
-              <a:rPr lang="es-ES" sz="900" dirty="0" smtClean="0">
-                <a:solidFill>
-                  <a:schemeClr val="tx1"/>
-                </a:solidFill>
-                <a:latin typeface="Arial" panose="020B0604020202020204" pitchFamily="34" charset="0"/>
-                <a:cs typeface="Arial" panose="020B0604020202020204" pitchFamily="34" charset="0"/>
-              </a:rPr>
-              <a:t>divisor</a:t>
+              <a:t>multiplicando la expresión algebraica del dividendo por la expresión algebraica recíproca del divisor</a:t>
             </a:r>
             <a:endParaRPr lang="es-ES" sz="900" dirty="0">
               <a:solidFill>

</xml_diff>